<commit_message>
presentation and pz upd
</commit_message>
<xml_diff>
--- a/Бот Семён.pptx
+++ b/Бот Семён.pptx
@@ -108,6 +108,11 @@
       </a:defRPr>
     </a:lvl9pPr>
   </p:defaultTextStyle>
+  <p:extLst>
+    <p:ext uri="{EFAFB233-063F-42B5-8137-9DF3F51BA10A}">
+      <p15:sldGuideLst xmlns:p15="http://schemas.microsoft.com/office/powerpoint/2012/main"/>
+    </p:ext>
+  </p:extLst>
 </p:presentation>
 </file>
 
@@ -281,7 +286,7 @@
             <a:fld id="{87DE6118-2437-4B30-8E3C-4D2BE6020583}" type="datetimeFigureOut">
               <a:rPr lang="en-US" dirty="0"/>
               <a:pPr/>
-              <a:t>4/13/2023</a:t>
+              <a:t>4/18/2023</a:t>
             </a:fld>
             <a:endParaRPr lang="en-US" dirty="0"/>
           </a:p>
@@ -607,7 +612,7 @@
           <a:p>
             <a:fld id="{87DE6118-2437-4B30-8E3C-4D2BE6020583}" type="datetimeFigureOut">
               <a:rPr lang="en-US" dirty="0"/>
-              <a:t>4/13/2023</a:t>
+              <a:t>4/18/2023</a:t>
             </a:fld>
             <a:endParaRPr lang="en-US" dirty="0"/>
           </a:p>
@@ -782,7 +787,7 @@
           <a:p>
             <a:fld id="{87DE6118-2437-4B30-8E3C-4D2BE6020583}" type="datetimeFigureOut">
               <a:rPr lang="en-US" dirty="0"/>
-              <a:t>4/13/2023</a:t>
+              <a:t>4/18/2023</a:t>
             </a:fld>
             <a:endParaRPr lang="en-US" dirty="0"/>
           </a:p>
@@ -947,7 +952,7 @@
           <a:p>
             <a:fld id="{87DE6118-2437-4B30-8E3C-4D2BE6020583}" type="datetimeFigureOut">
               <a:rPr lang="en-US" dirty="0"/>
-              <a:t>4/13/2023</a:t>
+              <a:t>4/18/2023</a:t>
             </a:fld>
             <a:endParaRPr lang="en-US" dirty="0"/>
           </a:p>
@@ -1220,7 +1225,7 @@
             <a:fld id="{87DE6118-2437-4B30-8E3C-4D2BE6020583}" type="datetimeFigureOut">
               <a:rPr lang="en-US" dirty="0"/>
               <a:pPr/>
-              <a:t>4/13/2023</a:t>
+              <a:t>4/18/2023</a:t>
             </a:fld>
             <a:endParaRPr lang="en-US" dirty="0"/>
           </a:p>
@@ -1610,7 +1615,7 @@
           <a:p>
             <a:fld id="{87DE6118-2437-4B30-8E3C-4D2BE6020583}" type="datetimeFigureOut">
               <a:rPr lang="en-US" dirty="0"/>
-              <a:t>4/13/2023</a:t>
+              <a:t>4/18/2023</a:t>
             </a:fld>
             <a:endParaRPr lang="en-US" dirty="0"/>
           </a:p>
@@ -2082,7 +2087,7 @@
           <a:p>
             <a:fld id="{87DE6118-2437-4B30-8E3C-4D2BE6020583}" type="datetimeFigureOut">
               <a:rPr lang="en-US" dirty="0"/>
-              <a:t>4/13/2023</a:t>
+              <a:t>4/18/2023</a:t>
             </a:fld>
             <a:endParaRPr lang="en-US" dirty="0"/>
           </a:p>
@@ -2195,7 +2200,7 @@
           <a:p>
             <a:fld id="{87DE6118-2437-4B30-8E3C-4D2BE6020583}" type="datetimeFigureOut">
               <a:rPr lang="en-US" dirty="0"/>
-              <a:t>4/13/2023</a:t>
+              <a:t>4/18/2023</a:t>
             </a:fld>
             <a:endParaRPr lang="en-US" dirty="0"/>
           </a:p>
@@ -2285,7 +2290,7 @@
           <a:p>
             <a:fld id="{87DE6118-2437-4B30-8E3C-4D2BE6020583}" type="datetimeFigureOut">
               <a:rPr lang="en-US" dirty="0"/>
-              <a:t>4/13/2023</a:t>
+              <a:t>4/18/2023</a:t>
             </a:fld>
             <a:endParaRPr lang="en-US" dirty="0"/>
           </a:p>
@@ -2627,7 +2632,7 @@
             <a:fld id="{87DE6118-2437-4B30-8E3C-4D2BE6020583}" type="datetimeFigureOut">
               <a:rPr lang="en-US" dirty="0"/>
               <a:pPr/>
-              <a:t>4/13/2023</a:t>
+              <a:t>4/18/2023</a:t>
             </a:fld>
             <a:endParaRPr lang="en-US" dirty="0"/>
           </a:p>
@@ -3012,7 +3017,7 @@
             <a:fld id="{87DE6118-2437-4B30-8E3C-4D2BE6020583}" type="datetimeFigureOut">
               <a:rPr lang="en-US" dirty="0"/>
               <a:pPr/>
-              <a:t>4/13/2023</a:t>
+              <a:t>4/18/2023</a:t>
             </a:fld>
             <a:endParaRPr lang="en-US" dirty="0"/>
           </a:p>
@@ -3287,7 +3292,7 @@
             <a:fld id="{87DE6118-2437-4B30-8E3C-4D2BE6020583}" type="datetimeFigureOut">
               <a:rPr lang="en-US" dirty="0"/>
               <a:pPr/>
-              <a:t>4/13/2023</a:t>
+              <a:t>4/18/2023</a:t>
             </a:fld>
             <a:endParaRPr lang="en-US" dirty="0"/>
           </a:p>
@@ -3961,12 +3966,17 @@
           <a:lstStyle/>
           <a:p>
             <a:r>
-              <a:rPr lang="ru-RU" sz="2400" dirty="0"/>
-              <a:t>Наш проект подразумевает собой Telegram бота с викториной про Мурманск и Мурманскую область, написанного на Python. В проекте реализуется общая таблица рейтинга, где пользователь может узнать результат других участников и увидеть своё место в данной таблице.</a:t>
-            </a:r>
-          </a:p>
-          <a:p>
-            <a:endParaRPr lang="ru-RU" dirty="0"/>
+              <a:rPr lang="ru-RU" dirty="0"/>
+              <a:t>Наш проект подразумевает собой Telegram бота с викториной про Мурманскую область и Кольский полуостров, написанного на </a:t>
+            </a:r>
+            <a:r>
+              <a:rPr lang="ru-RU" dirty="0" err="1"/>
+              <a:t>Python</a:t>
+            </a:r>
+            <a:r>
+              <a:rPr lang="ru-RU" dirty="0"/>
+              <a:t>. В проекте реализуется общая таблица рейтинга, где пользователь может узнать результат других участников и увидеть своё место в данной таблице.</a:t>
+            </a:r>
           </a:p>
         </p:txBody>
       </p:sp>
@@ -4077,7 +4087,7 @@
         </p:spPr>
         <p:txBody>
           <a:bodyPr>
-            <a:normAutofit fontScale="92500" lnSpcReduction="20000"/>
+            <a:normAutofit fontScale="85000" lnSpcReduction="20000"/>
           </a:bodyPr>
           <a:lstStyle/>
           <a:p>
@@ -4165,8 +4175,39 @@
             </a:r>
             <a:r>
               <a:rPr lang="ru-RU" sz="1600" b="1" i="0" dirty="0"/>
-              <a:t>ник участника.</a:t>
-            </a:r>
+              <a:t>ник участника</a:t>
+            </a:r>
+            <a:r>
+              <a:rPr lang="ru-RU" sz="1600" b="1" i="0" dirty="0" smtClean="0"/>
+              <a:t>.</a:t>
+            </a:r>
+            <a:endParaRPr lang="en-US" sz="1600" b="1" i="0" dirty="0" smtClean="0"/>
+          </a:p>
+          <a:p>
+            <a:pPr marL="742950" lvl="1" indent="-285750">
+              <a:spcAft>
+                <a:spcPts val="600"/>
+              </a:spcAft>
+              <a:buFont typeface="Arial" panose="020B0604020202020204" pitchFamily="34" charset="0"/>
+              <a:buChar char="•"/>
+            </a:pPr>
+            <a:r>
+              <a:rPr lang="en-US" sz="1600" b="1" i="0" dirty="0" err="1"/>
+              <a:t>user_id</a:t>
+            </a:r>
+            <a:r>
+              <a:rPr lang="en-US" sz="1600" b="1" i="0" dirty="0"/>
+              <a:t> – id </a:t>
+            </a:r>
+            <a:r>
+              <a:rPr lang="ru-RU" sz="1600" b="1" i="0" dirty="0"/>
+              <a:t>участника</a:t>
+            </a:r>
+            <a:r>
+              <a:rPr lang="ru-RU" sz="1600" b="1" i="0" dirty="0" smtClean="0"/>
+              <a:t>.</a:t>
+            </a:r>
+            <a:endParaRPr lang="ru-RU" sz="1600" b="1" i="0" dirty="0"/>
           </a:p>
           <a:p>
             <a:pPr marL="742950" lvl="1" indent="-285750">
@@ -4430,6 +4471,30 @@
           </a:p>
         </p:txBody>
       </p:sp>
+      <p:pic>
+        <p:nvPicPr>
+          <p:cNvPr id="6" name="Рисунок 5"/>
+          <p:cNvPicPr>
+            <a:picLocks noChangeAspect="1"/>
+          </p:cNvPicPr>
+          <p:nvPr/>
+        </p:nvPicPr>
+        <p:blipFill>
+          <a:blip r:embed="rId2"/>
+          <a:stretch>
+            <a:fillRect/>
+          </a:stretch>
+        </p:blipFill>
+        <p:spPr>
+          <a:xfrm>
+            <a:off x="5634973" y="1365453"/>
+            <a:ext cx="6454173" cy="4127091"/>
+          </a:xfrm>
+          <a:prstGeom prst="rect">
+            <a:avLst/>
+          </a:prstGeom>
+        </p:spPr>
+      </p:pic>
     </p:spTree>
     <p:extLst>
       <p:ext uri="{BB962C8B-B14F-4D97-AF65-F5344CB8AC3E}">
@@ -4537,254 +4602,236 @@
         </p:spPr>
         <p:txBody>
           <a:bodyPr>
-            <a:normAutofit/>
+            <a:normAutofit fontScale="92500" lnSpcReduction="10000"/>
           </a:bodyPr>
           <a:lstStyle/>
           <a:p>
-            <a:pPr>
-              <a:lnSpc>
-                <a:spcPct val="100000"/>
-              </a:lnSpc>
-              <a:spcAft>
-                <a:spcPts val="0"/>
-              </a:spcAft>
+            <a:r>
+              <a:rPr lang="ru-RU" b="1" dirty="0"/>
+              <a:t>Обработчики</a:t>
+            </a:r>
+            <a:r>
+              <a:rPr lang="en-US" b="1" dirty="0"/>
+              <a:t>:</a:t>
+            </a:r>
+            <a:endParaRPr lang="ru-RU" b="1" dirty="0"/>
+          </a:p>
+          <a:p>
+            <a:pPr marL="285750" lvl="0" indent="-285750">
+              <a:buFont typeface="Arial" panose="020B0604020202020204" pitchFamily="34" charset="0"/>
+              <a:buChar char="•"/>
             </a:pPr>
             <a:r>
-              <a:rPr lang="ru-RU" sz="1800" b="1" dirty="0"/>
-              <a:t>Обработчики</a:t>
-            </a:r>
-            <a:r>
-              <a:rPr lang="en-US" sz="1800" b="1" dirty="0"/>
-              <a:t>:</a:t>
-            </a:r>
-          </a:p>
-          <a:p>
-            <a:pPr>
-              <a:lnSpc>
-                <a:spcPct val="100000"/>
-              </a:lnSpc>
-              <a:spcAft>
-                <a:spcPts val="0"/>
-              </a:spcAft>
+              <a:rPr lang="en-US" b="1" i="1" dirty="0"/>
+              <a:t>start</a:t>
+            </a:r>
+            <a:r>
+              <a:rPr lang="ru-RU" dirty="0"/>
+              <a:t> – приветствие с пользователем и предоставление ему информации о командах бота</a:t>
+            </a:r>
+          </a:p>
+          <a:p>
+            <a:pPr marL="285750" lvl="0" indent="-285750">
+              <a:buFont typeface="Arial" panose="020B0604020202020204" pitchFamily="34" charset="0"/>
+              <a:buChar char="•"/>
             </a:pPr>
             <a:r>
-              <a:rPr lang="ru-RU" sz="1800" b="1" dirty="0"/>
-              <a:t>•</a:t>
-            </a:r>
-            <a:r>
-              <a:rPr lang="ru-RU" sz="1800" b="1" dirty="0" err="1"/>
-              <a:t>start</a:t>
-            </a:r>
-            <a:r>
-              <a:rPr lang="ru-RU" sz="1800" b="1" dirty="0"/>
-              <a:t> – вступительная фраза и предложение </a:t>
-            </a:r>
-            <a:r>
-              <a:rPr lang="ru-RU" sz="1800" b="1" dirty="0" err="1"/>
-              <a:t>квиза</a:t>
-            </a:r>
-            <a:r>
-              <a:rPr lang="ru-RU" sz="1800" b="1" dirty="0"/>
-              <a:t>.</a:t>
-            </a:r>
-          </a:p>
-          <a:p>
-            <a:pPr>
-              <a:lnSpc>
-                <a:spcPct val="100000"/>
-              </a:lnSpc>
-              <a:spcAft>
-                <a:spcPts val="0"/>
-              </a:spcAft>
+              <a:rPr lang="en-US" b="1" i="1" dirty="0"/>
+              <a:t>game</a:t>
+            </a:r>
+            <a:r>
+              <a:rPr lang="en-US" dirty="0"/>
+              <a:t> </a:t>
+            </a:r>
+            <a:r>
+              <a:rPr lang="ru-RU" dirty="0"/>
+              <a:t>– викторина со случайными вопросами</a:t>
+            </a:r>
+          </a:p>
+          <a:p>
+            <a:pPr marL="285750" lvl="0" indent="-285750">
+              <a:buFont typeface="Arial" panose="020B0604020202020204" pitchFamily="34" charset="0"/>
+              <a:buChar char="•"/>
             </a:pPr>
             <a:r>
-              <a:rPr lang="ru-RU" sz="1800" b="1" dirty="0"/>
-              <a:t>•</a:t>
-            </a:r>
-            <a:r>
-              <a:rPr lang="ru-RU" sz="1800" b="1" dirty="0" err="1"/>
-              <a:t>starting</a:t>
-            </a:r>
-            <a:r>
-              <a:rPr lang="ru-RU" sz="1800" b="1" dirty="0"/>
-              <a:t> – Ожидание ответа пользователя на предложение.</a:t>
-            </a:r>
-          </a:p>
-          <a:p>
-            <a:pPr>
-              <a:lnSpc>
-                <a:spcPct val="100000"/>
-              </a:lnSpc>
-              <a:spcAft>
-                <a:spcPts val="0"/>
-              </a:spcAft>
+              <a:rPr lang="en-US" b="1" i="1" dirty="0"/>
+              <a:t>results</a:t>
+            </a:r>
+            <a:r>
+              <a:rPr lang="en-US" dirty="0"/>
+              <a:t> – </a:t>
+            </a:r>
+            <a:r>
+              <a:rPr lang="ru-RU" dirty="0"/>
+              <a:t>проверка на правильность ответа</a:t>
+            </a:r>
+          </a:p>
+          <a:p>
+            <a:pPr marL="285750" lvl="0" indent="-285750">
+              <a:buFont typeface="Arial" panose="020B0604020202020204" pitchFamily="34" charset="0"/>
+              <a:buChar char="•"/>
             </a:pPr>
             <a:r>
-              <a:rPr lang="ru-RU" sz="1800" b="1" dirty="0"/>
-              <a:t>•</a:t>
-            </a:r>
-            <a:r>
-              <a:rPr lang="ru-RU" sz="1800" b="1" dirty="0" err="1"/>
+              <a:rPr lang="en-US" b="1" i="1" dirty="0"/>
+              <a:t>fork </a:t>
+            </a:r>
+            <a:r>
+              <a:rPr lang="ru-RU" b="1" i="1" dirty="0"/>
+              <a:t>(</a:t>
+            </a:r>
+            <a:r>
+              <a:rPr lang="en-US" b="1" i="1" dirty="0"/>
+              <a:t>cat</a:t>
+            </a:r>
+            <a:r>
+              <a:rPr lang="ru-RU" b="1" i="1" dirty="0"/>
+              <a:t>_</a:t>
+            </a:r>
+            <a:r>
+              <a:rPr lang="en-US" b="1" i="1" dirty="0"/>
+              <a:t>fork</a:t>
+            </a:r>
+            <a:r>
+              <a:rPr lang="ru-RU" b="1" i="1" dirty="0"/>
+              <a:t>)</a:t>
+            </a:r>
+            <a:r>
+              <a:rPr lang="ru-RU" i="1" dirty="0"/>
+              <a:t> </a:t>
+            </a:r>
+            <a:r>
+              <a:rPr lang="ru-RU" dirty="0"/>
+              <a:t>– уточняет у пользователя, хочет ли он продолжить викторину</a:t>
+            </a:r>
+          </a:p>
+          <a:p>
+            <a:pPr marL="285750" lvl="0" indent="-285750">
+              <a:buFont typeface="Arial" panose="020B0604020202020204" pitchFamily="34" charset="0"/>
+              <a:buChar char="•"/>
+            </a:pPr>
+            <a:r>
+              <a:rPr lang="en-US" b="1" i="1" dirty="0"/>
               <a:t>categories</a:t>
             </a:r>
             <a:r>
-              <a:rPr lang="ru-RU" sz="1800" b="1" dirty="0"/>
-              <a:t> – выбор категории </a:t>
-            </a:r>
-            <a:r>
-              <a:rPr lang="ru-RU" sz="1800" b="1" dirty="0" err="1"/>
-              <a:t>квиза</a:t>
-            </a:r>
-            <a:r>
-              <a:rPr lang="ru-RU" sz="1800" b="1" dirty="0"/>
-              <a:t>.</a:t>
-            </a:r>
-          </a:p>
-          <a:p>
-            <a:pPr>
-              <a:lnSpc>
-                <a:spcPct val="100000"/>
-              </a:lnSpc>
-              <a:spcAft>
-                <a:spcPts val="0"/>
-              </a:spcAft>
+              <a:rPr lang="en-US" dirty="0"/>
+              <a:t> – </a:t>
+            </a:r>
+            <a:r>
+              <a:rPr lang="ru-RU" dirty="0"/>
+              <a:t>выбор категории</a:t>
+            </a:r>
+          </a:p>
+          <a:p>
+            <a:pPr marL="285750" lvl="0" indent="-285750">
+              <a:buFont typeface="Arial" panose="020B0604020202020204" pitchFamily="34" charset="0"/>
+              <a:buChar char="•"/>
             </a:pPr>
             <a:r>
-              <a:rPr lang="ru-RU" sz="1800" b="1" dirty="0"/>
-              <a:t>•</a:t>
-            </a:r>
-            <a:r>
-              <a:rPr lang="ru-RU" sz="1800" b="1" dirty="0" err="1"/>
-              <a:t>quiz</a:t>
-            </a:r>
-            <a:r>
-              <a:rPr lang="ru-RU" sz="1800" b="1" dirty="0"/>
-              <a:t> – вывод текстов вопросов и ожидание ответа на них.</a:t>
-            </a:r>
-          </a:p>
-          <a:p>
-            <a:pPr>
-              <a:lnSpc>
-                <a:spcPct val="100000"/>
-              </a:lnSpc>
-              <a:spcAft>
-                <a:spcPts val="0"/>
-              </a:spcAft>
+              <a:rPr lang="en-US" b="1" i="1" dirty="0"/>
+              <a:t>categories</a:t>
+            </a:r>
+            <a:r>
+              <a:rPr lang="ru-RU" b="1" i="1" dirty="0"/>
+              <a:t>_</a:t>
+            </a:r>
+            <a:r>
+              <a:rPr lang="en-US" b="1" i="1" dirty="0"/>
+              <a:t>game </a:t>
+            </a:r>
+            <a:r>
+              <a:rPr lang="ru-RU" dirty="0"/>
+              <a:t>– викторина по выбранной категории</a:t>
+            </a:r>
+          </a:p>
+          <a:p>
+            <a:pPr marL="285750" lvl="0" indent="-285750">
+              <a:buFont typeface="Arial" panose="020B0604020202020204" pitchFamily="34" charset="0"/>
+              <a:buChar char="•"/>
             </a:pPr>
             <a:r>
-              <a:rPr lang="ru-RU" sz="1800" b="1" dirty="0"/>
-              <a:t>•</a:t>
-            </a:r>
-            <a:r>
-              <a:rPr lang="ru-RU" sz="1800" b="1" dirty="0" err="1"/>
-              <a:t>results</a:t>
-            </a:r>
-            <a:r>
-              <a:rPr lang="ru-RU" sz="1800" b="1" dirty="0"/>
-              <a:t> – проверка ответа на вопрос и начисление очков.</a:t>
-            </a:r>
-          </a:p>
-          <a:p>
-            <a:pPr>
-              <a:lnSpc>
-                <a:spcPct val="100000"/>
-              </a:lnSpc>
-              <a:spcAft>
-                <a:spcPts val="0"/>
-              </a:spcAft>
+              <a:rPr lang="en-US" b="1" i="1" dirty="0"/>
+              <a:t>stat</a:t>
+            </a:r>
+            <a:r>
+              <a:rPr lang="en-US" dirty="0"/>
+              <a:t> – </a:t>
+            </a:r>
+            <a:r>
+              <a:rPr lang="ru-RU" dirty="0"/>
+              <a:t>рейтинг </a:t>
+            </a:r>
+          </a:p>
+          <a:p>
+            <a:pPr marL="285750" lvl="0" indent="-285750">
+              <a:buFont typeface="Arial" panose="020B0604020202020204" pitchFamily="34" charset="0"/>
+              <a:buChar char="•"/>
             </a:pPr>
             <a:r>
-              <a:rPr lang="ru-RU" sz="1800" b="1" dirty="0"/>
-              <a:t>•</a:t>
-            </a:r>
-            <a:r>
-              <a:rPr lang="ru-RU" sz="1800" b="1" dirty="0" err="1"/>
-              <a:t>finish</a:t>
-            </a:r>
-            <a:r>
-              <a:rPr lang="ru-RU" sz="1800" b="1" dirty="0"/>
-              <a:t> – вывод результата топ-5 пользователей и текущего пользователя.</a:t>
-            </a:r>
-          </a:p>
-          <a:p>
-            <a:pPr>
-              <a:lnSpc>
-                <a:spcPct val="100000"/>
-              </a:lnSpc>
-              <a:spcAft>
-                <a:spcPts val="0"/>
-              </a:spcAft>
+              <a:rPr lang="en-US" b="1" i="1" dirty="0"/>
+              <a:t>help</a:t>
+            </a:r>
+            <a:r>
+              <a:rPr lang="ru-RU" b="1" i="1" dirty="0"/>
+              <a:t>_</a:t>
+            </a:r>
+            <a:r>
+              <a:rPr lang="en-US" b="1" i="1" dirty="0"/>
+              <a:t>command</a:t>
+            </a:r>
+            <a:r>
+              <a:rPr lang="ru-RU" b="1" i="1" dirty="0"/>
+              <a:t> </a:t>
+            </a:r>
+            <a:r>
+              <a:rPr lang="ru-RU" dirty="0"/>
+              <a:t>– вывод информации об авторах бота</a:t>
+            </a:r>
+          </a:p>
+          <a:p>
+            <a:pPr marL="285750" lvl="0" indent="-285750">
+              <a:buFont typeface="Arial" panose="020B0604020202020204" pitchFamily="34" charset="0"/>
+              <a:buChar char="•"/>
             </a:pPr>
             <a:r>
-              <a:rPr lang="ru-RU" sz="1800" b="1" dirty="0"/>
-              <a:t>•</a:t>
-            </a:r>
-            <a:r>
-              <a:rPr lang="ru-RU" sz="1800" b="1" dirty="0" err="1"/>
-              <a:t>to_beginning</a:t>
-            </a:r>
-            <a:r>
-              <a:rPr lang="ru-RU" sz="1800" b="1" dirty="0"/>
-              <a:t> – возвращение к выбору категорий.</a:t>
-            </a:r>
-          </a:p>
-          <a:p>
-            <a:pPr>
-              <a:lnSpc>
-                <a:spcPct val="100000"/>
-              </a:lnSpc>
-              <a:spcAft>
-                <a:spcPts val="0"/>
-              </a:spcAft>
-            </a:pPr>
-            <a:r>
-              <a:rPr lang="ru-RU" sz="1800" b="1" dirty="0"/>
-              <a:t>•</a:t>
-            </a:r>
-            <a:r>
-              <a:rPr lang="ru-RU" sz="1800" b="1" dirty="0" err="1"/>
-              <a:t>help_command</a:t>
-            </a:r>
-            <a:r>
-              <a:rPr lang="ru-RU" sz="1800" b="1" dirty="0"/>
-              <a:t> – вывод справки о командах.</a:t>
-            </a:r>
-          </a:p>
-          <a:p>
-            <a:pPr>
-              <a:lnSpc>
-                <a:spcPct val="100000"/>
-              </a:lnSpc>
-              <a:spcAft>
-                <a:spcPts val="0"/>
-              </a:spcAft>
-            </a:pPr>
-            <a:r>
-              <a:rPr lang="ru-RU" sz="1800" b="1" dirty="0"/>
-              <a:t>•</a:t>
-            </a:r>
-            <a:r>
-              <a:rPr lang="ru-RU" sz="1800" b="1" dirty="0" err="1"/>
+              <a:rPr lang="en-US" b="1" i="1" dirty="0"/>
               <a:t>stop</a:t>
             </a:r>
             <a:r>
-              <a:rPr lang="ru-RU" sz="1800" b="1" dirty="0"/>
-              <a:t> – завершение сессии.</a:t>
-            </a:r>
-          </a:p>
-          <a:p>
-            <a:pPr>
-              <a:lnSpc>
-                <a:spcPct val="100000"/>
-              </a:lnSpc>
-              <a:spcAft>
-                <a:spcPts val="0"/>
-              </a:spcAft>
-            </a:pPr>
-            <a:endParaRPr lang="ru-RU" dirty="0"/>
-          </a:p>
-        </p:txBody>
-      </p:sp>
+              <a:rPr lang="en-US" dirty="0"/>
+              <a:t> – </a:t>
+            </a:r>
+            <a:r>
+              <a:rPr lang="ru-RU" dirty="0"/>
+              <a:t>завершение сессии.</a:t>
+            </a:r>
+          </a:p>
+        </p:txBody>
+      </p:sp>
+      <p:pic>
+        <p:nvPicPr>
+          <p:cNvPr id="7" name="Рисунок 6"/>
+          <p:cNvPicPr>
+            <a:picLocks noChangeAspect="1"/>
+          </p:cNvPicPr>
+          <p:nvPr/>
+        </p:nvPicPr>
+        <p:blipFill>
+          <a:blip r:embed="rId2"/>
+          <a:stretch>
+            <a:fillRect/>
+          </a:stretch>
+        </p:blipFill>
+        <p:spPr>
+          <a:xfrm>
+            <a:off x="5752147" y="814386"/>
+            <a:ext cx="6219825" cy="5229225"/>
+          </a:xfrm>
+          <a:prstGeom prst="rect">
+            <a:avLst/>
+          </a:prstGeom>
+        </p:spPr>
+      </p:pic>
     </p:spTree>
     <p:extLst>
       <p:ext uri="{BB962C8B-B14F-4D97-AF65-F5344CB8AC3E}">

</xml_diff>

<commit_message>
pz and presentation upd
</commit_message>
<xml_diff>
--- a/Бот Семён.pptx
+++ b/Бот Семён.pptx
@@ -7112,32 +7112,6 @@
           </a:p>
         </p:txBody>
       </p:sp>
-      <p:pic>
-        <p:nvPicPr>
-          <p:cNvPr id="12" name="Объект 11"/>
-          <p:cNvPicPr>
-            <a:picLocks noGrp="1" noChangeAspect="1"/>
-          </p:cNvPicPr>
-          <p:nvPr>
-            <p:ph idx="1"/>
-          </p:nvPr>
-        </p:nvPicPr>
-        <p:blipFill>
-          <a:blip r:embed="rId2"/>
-          <a:stretch>
-            <a:fillRect/>
-          </a:stretch>
-        </p:blipFill>
-        <p:spPr>
-          <a:xfrm>
-            <a:off x="765175" y="1444301"/>
-            <a:ext cx="6157913" cy="3937648"/>
-          </a:xfrm>
-          <a:prstGeom prst="rect">
-            <a:avLst/>
-          </a:prstGeom>
-        </p:spPr>
-      </p:pic>
       <p:sp>
         <p:nvSpPr>
           <p:cNvPr id="10" name="Текст 9"/>
@@ -7598,6 +7572,56 @@
           </a:p>
         </p:txBody>
       </p:sp>
+      <p:pic>
+        <p:nvPicPr>
+          <p:cNvPr id="2" name="Рисунок 1"/>
+          <p:cNvPicPr>
+            <a:picLocks noChangeAspect="1"/>
+          </p:cNvPicPr>
+          <p:nvPr/>
+        </p:nvPicPr>
+        <p:blipFill>
+          <a:blip r:embed="rId2"/>
+          <a:stretch>
+            <a:fillRect/>
+          </a:stretch>
+        </p:blipFill>
+        <p:spPr>
+          <a:xfrm>
+            <a:off x="2191830" y="4544321"/>
+            <a:ext cx="4547928" cy="2050753"/>
+          </a:xfrm>
+          <a:prstGeom prst="rect">
+            <a:avLst/>
+          </a:prstGeom>
+        </p:spPr>
+      </p:pic>
+      <p:pic>
+        <p:nvPicPr>
+          <p:cNvPr id="4" name="Объект 3"/>
+          <p:cNvPicPr>
+            <a:picLocks noGrp="1" noChangeAspect="1"/>
+          </p:cNvPicPr>
+          <p:nvPr>
+            <p:ph idx="1"/>
+          </p:nvPr>
+        </p:nvPicPr>
+        <p:blipFill>
+          <a:blip r:embed="rId3"/>
+          <a:stretch>
+            <a:fillRect/>
+          </a:stretch>
+        </p:blipFill>
+        <p:spPr>
+          <a:xfrm>
+            <a:off x="765175" y="1148908"/>
+            <a:ext cx="4547804" cy="3344385"/>
+          </a:xfrm>
+          <a:prstGeom prst="rect">
+            <a:avLst/>
+          </a:prstGeom>
+        </p:spPr>
+      </p:pic>
     </p:spTree>
     <p:extLst>
       <p:ext uri="{BB962C8B-B14F-4D97-AF65-F5344CB8AC3E}">
@@ -8606,8 +8630,47 @@
               <a:rPr lang="ru-RU" sz="1400" dirty="0">
                 <a:latin typeface="Corbel Light" panose="020B0303020204020204" pitchFamily="34" charset="0"/>
               </a:rPr>
-              <a:t>– вывод информации об авторах бота</a:t>
-            </a:r>
+              <a:t>– вывод информации об авторах </a:t>
+            </a:r>
+            <a:r>
+              <a:rPr lang="ru-RU" sz="1400" dirty="0" smtClean="0">
+                <a:latin typeface="Corbel Light" panose="020B0303020204020204" pitchFamily="34" charset="0"/>
+              </a:rPr>
+              <a:t>бота</a:t>
+            </a:r>
+          </a:p>
+          <a:p>
+            <a:pPr marL="285750" lvl="0" indent="-285750">
+              <a:spcBef>
+                <a:spcPts val="600"/>
+              </a:spcBef>
+              <a:buClr>
+                <a:schemeClr val="bg2"/>
+              </a:buClr>
+              <a:buFont typeface="Arial" panose="020B0604020202020204" pitchFamily="34" charset="0"/>
+              <a:buChar char="•"/>
+            </a:pPr>
+            <a:r>
+              <a:rPr lang="ru-RU" sz="1400" i="1" dirty="0" err="1" smtClean="0">
+                <a:latin typeface="Corbel Light" panose="020B0303020204020204" pitchFamily="34" charset="0"/>
+              </a:rPr>
+              <a:t>add</a:t>
+            </a:r>
+            <a:r>
+              <a:rPr lang="ru-RU" sz="1400" dirty="0" smtClean="0">
+                <a:latin typeface="Corbel Light" panose="020B0303020204020204" pitchFamily="34" charset="0"/>
+              </a:rPr>
+              <a:t> </a:t>
+            </a:r>
+            <a:r>
+              <a:rPr lang="ru-RU" sz="1400" dirty="0">
+                <a:latin typeface="Corbel Light" panose="020B0303020204020204" pitchFamily="34" charset="0"/>
+              </a:rPr>
+              <a:t>– добавление нового вопроса в викторину</a:t>
+            </a:r>
+            <a:endParaRPr lang="ru-RU" sz="1400" dirty="0">
+              <a:latin typeface="Corbel Light" panose="020B0303020204020204" pitchFamily="34" charset="0"/>
+            </a:endParaRPr>
           </a:p>
           <a:p>
             <a:pPr marL="285750" lvl="0" indent="-285750">

</xml_diff>